<commit_message>
add: crud functionalities add: views for article crud add: routes for article crud TODO: adapt functions in controllers, yet only C/P
</commit_message>
<xml_diff>
--- a/Zusatz_Material/Web-Technologie.pptx
+++ b/Zusatz_Material/Web-Technologie.pptx
@@ -4,6 +4,9 @@
   <p:sldMasterIdLst>
     <p:sldMasterId id="2147483648" r:id="rId1"/>
   </p:sldMasterIdLst>
+  <p:notesMasterIdLst>
+    <p:notesMasterId r:id="rId24"/>
+  </p:notesMasterIdLst>
   <p:sldIdLst>
     <p:sldId id="256" r:id="rId2"/>
     <p:sldId id="257" r:id="rId3"/>
@@ -25,6 +28,8 @@
     <p:sldId id="273" r:id="rId19"/>
     <p:sldId id="274" r:id="rId20"/>
     <p:sldId id="275" r:id="rId21"/>
+    <p:sldId id="277" r:id="rId22"/>
+    <p:sldId id="276" r:id="rId23"/>
   </p:sldIdLst>
   <p:sldSz cx="12192000" cy="6858000"/>
   <p:notesSz cx="6858000" cy="9144000"/>
@@ -134,7 +139,7 @@
 <file path=ppt/revisionInfo.xml><?xml version="1.0" encoding="utf-8"?>
 <p1510:revInfo xmlns:a="http://schemas.openxmlformats.org/drawingml/2006/main" xmlns:r="http://schemas.openxmlformats.org/officeDocument/2006/relationships" xmlns:p1510="http://schemas.microsoft.com/office/powerpoint/2015/10/main">
   <p1510:revLst>
-    <p1510:client id="{FB3507A5-FAD4-4A3A-9811-108DF476A894}" v="1" dt="2023-04-07T12:56:00.486"/>
+    <p1510:client id="{161CE342-97DC-4B7F-9039-D104E73B5769}" v="21" dt="2023-04-20T08:50:21.553"/>
   </p1510:revLst>
 </p1510:revInfo>
 </file>
@@ -664,7 +669,529 @@
       </pc:sldChg>
     </pc:docChg>
   </pc:docChgLst>
+  <pc:docChgLst>
+    <pc:chgData name="Simon Driescher" userId="fcef99ce1c40fef3" providerId="LiveId" clId="{161CE342-97DC-4B7F-9039-D104E73B5769}"/>
+    <pc:docChg chg="undo redo custSel addSld modSld">
+      <pc:chgData name="Simon Driescher" userId="fcef99ce1c40fef3" providerId="LiveId" clId="{161CE342-97DC-4B7F-9039-D104E73B5769}" dt="2023-04-20T08:50:22.372" v="72" actId="20577"/>
+      <pc:docMkLst>
+        <pc:docMk/>
+      </pc:docMkLst>
+      <pc:sldChg chg="addSp delSp modSp mod">
+        <pc:chgData name="Simon Driescher" userId="fcef99ce1c40fef3" providerId="LiveId" clId="{161CE342-97DC-4B7F-9039-D104E73B5769}" dt="2023-04-20T08:00:42.007" v="23" actId="1076"/>
+        <pc:sldMkLst>
+          <pc:docMk/>
+          <pc:sldMk cId="567203280" sldId="274"/>
+        </pc:sldMkLst>
+        <pc:spChg chg="mod">
+          <ac:chgData name="Simon Driescher" userId="fcef99ce1c40fef3" providerId="LiveId" clId="{161CE342-97DC-4B7F-9039-D104E73B5769}" dt="2023-04-20T07:59:53.003" v="19" actId="20577"/>
+          <ac:spMkLst>
+            <pc:docMk/>
+            <pc:sldMk cId="567203280" sldId="274"/>
+            <ac:spMk id="2" creationId="{DEB5CCB0-F863-096A-F423-B652C436A660}"/>
+          </ac:spMkLst>
+        </pc:spChg>
+        <pc:picChg chg="del mod">
+          <ac:chgData name="Simon Driescher" userId="fcef99ce1c40fef3" providerId="LiveId" clId="{161CE342-97DC-4B7F-9039-D104E73B5769}" dt="2023-04-20T08:00:27.646" v="21" actId="478"/>
+          <ac:picMkLst>
+            <pc:docMk/>
+            <pc:sldMk cId="567203280" sldId="274"/>
+            <ac:picMk id="4" creationId="{85F1854B-D1F7-CE14-BE9C-5A2AC72770E7}"/>
+          </ac:picMkLst>
+        </pc:picChg>
+        <pc:picChg chg="add mod">
+          <ac:chgData name="Simon Driescher" userId="fcef99ce1c40fef3" providerId="LiveId" clId="{161CE342-97DC-4B7F-9039-D104E73B5769}" dt="2023-04-20T08:00:42.007" v="23" actId="1076"/>
+          <ac:picMkLst>
+            <pc:docMk/>
+            <pc:sldMk cId="567203280" sldId="274"/>
+            <ac:picMk id="6" creationId="{20F0AC27-6133-A2CF-DB02-2D3B8E1B34A9}"/>
+          </ac:picMkLst>
+        </pc:picChg>
+      </pc:sldChg>
+      <pc:sldChg chg="addSp delSp modSp mod">
+        <pc:chgData name="Simon Driescher" userId="fcef99ce1c40fef3" providerId="LiveId" clId="{161CE342-97DC-4B7F-9039-D104E73B5769}" dt="2023-04-20T07:59:45.853" v="12" actId="22"/>
+        <pc:sldMkLst>
+          <pc:docMk/>
+          <pc:sldMk cId="642237072" sldId="275"/>
+        </pc:sldMkLst>
+        <pc:spChg chg="mod">
+          <ac:chgData name="Simon Driescher" userId="fcef99ce1c40fef3" providerId="LiveId" clId="{161CE342-97DC-4B7F-9039-D104E73B5769}" dt="2023-04-20T07:58:47.356" v="11" actId="122"/>
+          <ac:spMkLst>
+            <pc:docMk/>
+            <pc:sldMk cId="642237072" sldId="275"/>
+            <ac:spMk id="2" creationId="{2BF6B6AA-7BC4-4AD9-1810-033ADBF68559}"/>
+          </ac:spMkLst>
+        </pc:spChg>
+        <pc:spChg chg="add del mod">
+          <ac:chgData name="Simon Driescher" userId="fcef99ce1c40fef3" providerId="LiveId" clId="{161CE342-97DC-4B7F-9039-D104E73B5769}" dt="2023-04-20T07:59:45.853" v="12" actId="22"/>
+          <ac:spMkLst>
+            <pc:docMk/>
+            <pc:sldMk cId="642237072" sldId="275"/>
+            <ac:spMk id="5" creationId="{64AA7B13-FEFD-65E1-3669-2F11A1BC3B88}"/>
+          </ac:spMkLst>
+        </pc:spChg>
+        <pc:picChg chg="del">
+          <ac:chgData name="Simon Driescher" userId="fcef99ce1c40fef3" providerId="LiveId" clId="{161CE342-97DC-4B7F-9039-D104E73B5769}" dt="2023-04-20T07:58:35.563" v="0" actId="478"/>
+          <ac:picMkLst>
+            <pc:docMk/>
+            <pc:sldMk cId="642237072" sldId="275"/>
+            <ac:picMk id="4" creationId="{01100B9A-4F21-DE69-114B-1C7917F3CCD3}"/>
+          </ac:picMkLst>
+        </pc:picChg>
+        <pc:picChg chg="del">
+          <ac:chgData name="Simon Driescher" userId="fcef99ce1c40fef3" providerId="LiveId" clId="{161CE342-97DC-4B7F-9039-D104E73B5769}" dt="2023-04-20T07:58:40.942" v="3" actId="478"/>
+          <ac:picMkLst>
+            <pc:docMk/>
+            <pc:sldMk cId="642237072" sldId="275"/>
+            <ac:picMk id="6" creationId="{88926D69-DF47-9DE2-CFD4-041533A6899E}"/>
+          </ac:picMkLst>
+        </pc:picChg>
+        <pc:picChg chg="del">
+          <ac:chgData name="Simon Driescher" userId="fcef99ce1c40fef3" providerId="LiveId" clId="{161CE342-97DC-4B7F-9039-D104E73B5769}" dt="2023-04-20T07:58:39.777" v="2" actId="478"/>
+          <ac:picMkLst>
+            <pc:docMk/>
+            <pc:sldMk cId="642237072" sldId="275"/>
+            <ac:picMk id="8" creationId="{70E92C90-C040-345C-814C-33A8198336AD}"/>
+          </ac:picMkLst>
+        </pc:picChg>
+        <pc:picChg chg="del">
+          <ac:chgData name="Simon Driescher" userId="fcef99ce1c40fef3" providerId="LiveId" clId="{161CE342-97DC-4B7F-9039-D104E73B5769}" dt="2023-04-20T07:58:37.970" v="1" actId="478"/>
+          <ac:picMkLst>
+            <pc:docMk/>
+            <pc:sldMk cId="642237072" sldId="275"/>
+            <ac:picMk id="10" creationId="{9B3B01A1-B384-4BBD-A0A1-FA1123CC1DB5}"/>
+          </ac:picMkLst>
+        </pc:picChg>
+        <pc:picChg chg="add mod ord">
+          <ac:chgData name="Simon Driescher" userId="fcef99ce1c40fef3" providerId="LiveId" clId="{161CE342-97DC-4B7F-9039-D104E73B5769}" dt="2023-04-20T07:59:45.853" v="12" actId="22"/>
+          <ac:picMkLst>
+            <pc:docMk/>
+            <pc:sldMk cId="642237072" sldId="275"/>
+            <ac:picMk id="11" creationId="{0120A8BF-6FDC-AF10-675D-9E68B803CEF7}"/>
+          </ac:picMkLst>
+        </pc:picChg>
+      </pc:sldChg>
+      <pc:sldChg chg="addSp delSp modSp new mod setBg">
+        <pc:chgData name="Simon Driescher" userId="fcef99ce1c40fef3" providerId="LiveId" clId="{161CE342-97DC-4B7F-9039-D104E73B5769}" dt="2023-04-20T08:50:21.553" v="70"/>
+        <pc:sldMkLst>
+          <pc:docMk/>
+          <pc:sldMk cId="1571712763" sldId="276"/>
+        </pc:sldMkLst>
+        <pc:spChg chg="mod">
+          <ac:chgData name="Simon Driescher" userId="fcef99ce1c40fef3" providerId="LiveId" clId="{161CE342-97DC-4B7F-9039-D104E73B5769}" dt="2023-04-20T08:48:10.340" v="36" actId="122"/>
+          <ac:spMkLst>
+            <pc:docMk/>
+            <pc:sldMk cId="1571712763" sldId="276"/>
+            <ac:spMk id="2" creationId="{CA15BB45-5CFD-3056-AEE5-64F4474D6FC7}"/>
+          </ac:spMkLst>
+        </pc:spChg>
+        <pc:spChg chg="del">
+          <ac:chgData name="Simon Driescher" userId="fcef99ce1c40fef3" providerId="LiveId" clId="{161CE342-97DC-4B7F-9039-D104E73B5769}" dt="2023-04-20T08:48:13.625" v="37"/>
+          <ac:spMkLst>
+            <pc:docMk/>
+            <pc:sldMk cId="1571712763" sldId="276"/>
+            <ac:spMk id="3" creationId="{6009EBD0-1394-5161-BFB9-ACBACF773322}"/>
+          </ac:spMkLst>
+        </pc:spChg>
+        <pc:picChg chg="add mod">
+          <ac:chgData name="Simon Driescher" userId="fcef99ce1c40fef3" providerId="LiveId" clId="{161CE342-97DC-4B7F-9039-D104E73B5769}" dt="2023-04-20T08:48:18.503" v="41" actId="962"/>
+          <ac:picMkLst>
+            <pc:docMk/>
+            <pc:sldMk cId="1571712763" sldId="276"/>
+            <ac:picMk id="5" creationId="{B43A6382-AD2D-16E5-E94A-712E13782CDA}"/>
+          </ac:picMkLst>
+        </pc:picChg>
+      </pc:sldChg>
+      <pc:sldChg chg="addSp delSp modSp new mod modClrScheme chgLayout">
+        <pc:chgData name="Simon Driescher" userId="fcef99ce1c40fef3" providerId="LiveId" clId="{161CE342-97DC-4B7F-9039-D104E73B5769}" dt="2023-04-20T08:50:22.372" v="72" actId="20577"/>
+        <pc:sldMkLst>
+          <pc:docMk/>
+          <pc:sldMk cId="441623518" sldId="277"/>
+        </pc:sldMkLst>
+        <pc:spChg chg="del mod ord">
+          <ac:chgData name="Simon Driescher" userId="fcef99ce1c40fef3" providerId="LiveId" clId="{161CE342-97DC-4B7F-9039-D104E73B5769}" dt="2023-04-20T08:49:24.551" v="43" actId="700"/>
+          <ac:spMkLst>
+            <pc:docMk/>
+            <pc:sldMk cId="441623518" sldId="277"/>
+            <ac:spMk id="2" creationId="{9461CE4B-D021-8F39-530F-1813D4D5209D}"/>
+          </ac:spMkLst>
+        </pc:spChg>
+        <pc:spChg chg="del mod ord">
+          <ac:chgData name="Simon Driescher" userId="fcef99ce1c40fef3" providerId="LiveId" clId="{161CE342-97DC-4B7F-9039-D104E73B5769}" dt="2023-04-20T08:49:24.551" v="43" actId="700"/>
+          <ac:spMkLst>
+            <pc:docMk/>
+            <pc:sldMk cId="441623518" sldId="277"/>
+            <ac:spMk id="3" creationId="{61538305-64CE-DA22-B921-0D0E63407C34}"/>
+          </ac:spMkLst>
+        </pc:spChg>
+        <pc:spChg chg="add mod ord">
+          <ac:chgData name="Simon Driescher" userId="fcef99ce1c40fef3" providerId="LiveId" clId="{161CE342-97DC-4B7F-9039-D104E73B5769}" dt="2023-04-20T08:50:22.372" v="72" actId="20577"/>
+          <ac:spMkLst>
+            <pc:docMk/>
+            <pc:sldMk cId="441623518" sldId="277"/>
+            <ac:spMk id="4" creationId="{7F778F60-9CC1-C449-572F-8A8864A3FB0B}"/>
+          </ac:spMkLst>
+        </pc:spChg>
+        <pc:spChg chg="add mod ord">
+          <ac:chgData name="Simon Driescher" userId="fcef99ce1c40fef3" providerId="LiveId" clId="{161CE342-97DC-4B7F-9039-D104E73B5769}" dt="2023-04-20T08:49:24.551" v="43" actId="700"/>
+          <ac:spMkLst>
+            <pc:docMk/>
+            <pc:sldMk cId="441623518" sldId="277"/>
+            <ac:spMk id="5" creationId="{4F6523E6-17CC-2CE0-E565-03647EBF73D3}"/>
+          </ac:spMkLst>
+        </pc:spChg>
+      </pc:sldChg>
+    </pc:docChg>
+  </pc:docChgLst>
 </pc:chgInfo>
+</file>
+
+<file path=ppt/notesMasters/notesMaster1.xml><?xml version="1.0" encoding="utf-8"?>
+<p:notesMaster xmlns:a="http://schemas.openxmlformats.org/drawingml/2006/main" xmlns:r="http://schemas.openxmlformats.org/officeDocument/2006/relationships" xmlns:p="http://schemas.openxmlformats.org/presentationml/2006/main">
+  <p:cSld>
+    <p:bg>
+      <p:bgRef idx="1001">
+        <a:schemeClr val="bg1"/>
+      </p:bgRef>
+    </p:bg>
+    <p:spTree>
+      <p:nvGrpSpPr>
+        <p:cNvPr id="1" name=""/>
+        <p:cNvGrpSpPr/>
+        <p:nvPr/>
+      </p:nvGrpSpPr>
+      <p:grpSpPr>
+        <a:xfrm>
+          <a:off x="0" y="0"/>
+          <a:ext cx="0" cy="0"/>
+          <a:chOff x="0" y="0"/>
+          <a:chExt cx="0" cy="0"/>
+        </a:xfrm>
+      </p:grpSpPr>
+      <p:sp>
+        <p:nvSpPr>
+          <p:cNvPr id="2" name="Kopfzeilenplatzhalter 1"/>
+          <p:cNvSpPr>
+            <a:spLocks noGrp="1"/>
+          </p:cNvSpPr>
+          <p:nvPr>
+            <p:ph type="hdr" sz="quarter"/>
+          </p:nvPr>
+        </p:nvSpPr>
+        <p:spPr>
+          <a:xfrm>
+            <a:off x="0" y="0"/>
+            <a:ext cx="2971800" cy="458788"/>
+          </a:xfrm>
+          <a:prstGeom prst="rect">
+            <a:avLst/>
+          </a:prstGeom>
+        </p:spPr>
+        <p:txBody>
+          <a:bodyPr vert="horz" lIns="91440" tIns="45720" rIns="91440" bIns="45720" rtlCol="0"/>
+          <a:lstStyle>
+            <a:lvl1pPr algn="l">
+              <a:defRPr sz="1200"/>
+            </a:lvl1pPr>
+          </a:lstStyle>
+          <a:p>
+            <a:endParaRPr lang="de-DE"/>
+          </a:p>
+        </p:txBody>
+      </p:sp>
+      <p:sp>
+        <p:nvSpPr>
+          <p:cNvPr id="3" name="Datumsplatzhalter 2"/>
+          <p:cNvSpPr>
+            <a:spLocks noGrp="1"/>
+          </p:cNvSpPr>
+          <p:nvPr>
+            <p:ph type="dt" idx="1"/>
+          </p:nvPr>
+        </p:nvSpPr>
+        <p:spPr>
+          <a:xfrm>
+            <a:off x="3884613" y="0"/>
+            <a:ext cx="2971800" cy="458788"/>
+          </a:xfrm>
+          <a:prstGeom prst="rect">
+            <a:avLst/>
+          </a:prstGeom>
+        </p:spPr>
+        <p:txBody>
+          <a:bodyPr vert="horz" lIns="91440" tIns="45720" rIns="91440" bIns="45720" rtlCol="0"/>
+          <a:lstStyle>
+            <a:lvl1pPr algn="r">
+              <a:defRPr sz="1200"/>
+            </a:lvl1pPr>
+          </a:lstStyle>
+          <a:p>
+            <a:fld id="{ADB0D137-6C08-47E3-913F-08CE2AAEBB97}" type="datetimeFigureOut">
+              <a:rPr lang="de-DE" smtClean="0"/>
+              <a:t>20.04.2023</a:t>
+            </a:fld>
+            <a:endParaRPr lang="de-DE"/>
+          </a:p>
+        </p:txBody>
+      </p:sp>
+      <p:sp>
+        <p:nvSpPr>
+          <p:cNvPr id="4" name="Folienbildplatzhalter 3"/>
+          <p:cNvSpPr>
+            <a:spLocks noGrp="1" noRot="1" noChangeAspect="1"/>
+          </p:cNvSpPr>
+          <p:nvPr>
+            <p:ph type="sldImg" idx="2"/>
+          </p:nvPr>
+        </p:nvSpPr>
+        <p:spPr>
+          <a:xfrm>
+            <a:off x="685800" y="1143000"/>
+            <a:ext cx="5486400" cy="3086100"/>
+          </a:xfrm>
+          <a:prstGeom prst="rect">
+            <a:avLst/>
+          </a:prstGeom>
+          <a:noFill/>
+          <a:ln w="12700">
+            <a:solidFill>
+              <a:prstClr val="black"/>
+            </a:solidFill>
+          </a:ln>
+        </p:spPr>
+        <p:txBody>
+          <a:bodyPr vert="horz" lIns="91440" tIns="45720" rIns="91440" bIns="45720" rtlCol="0" anchor="ctr"/>
+          <a:lstStyle/>
+          <a:p>
+            <a:endParaRPr lang="de-DE"/>
+          </a:p>
+        </p:txBody>
+      </p:sp>
+      <p:sp>
+        <p:nvSpPr>
+          <p:cNvPr id="5" name="Notizenplatzhalter 4"/>
+          <p:cNvSpPr>
+            <a:spLocks noGrp="1"/>
+          </p:cNvSpPr>
+          <p:nvPr>
+            <p:ph type="body" sz="quarter" idx="3"/>
+          </p:nvPr>
+        </p:nvSpPr>
+        <p:spPr>
+          <a:xfrm>
+            <a:off x="685800" y="4400550"/>
+            <a:ext cx="5486400" cy="3600450"/>
+          </a:xfrm>
+          <a:prstGeom prst="rect">
+            <a:avLst/>
+          </a:prstGeom>
+        </p:spPr>
+        <p:txBody>
+          <a:bodyPr vert="horz" lIns="91440" tIns="45720" rIns="91440" bIns="45720" rtlCol="0"/>
+          <a:lstStyle/>
+          <a:p>
+            <a:pPr lvl="0"/>
+            <a:r>
+              <a:rPr lang="de-DE"/>
+              <a:t>Mastertextformat bearbeiten</a:t>
+            </a:r>
+          </a:p>
+          <a:p>
+            <a:pPr lvl="1"/>
+            <a:r>
+              <a:rPr lang="de-DE"/>
+              <a:t>Zweite Ebene</a:t>
+            </a:r>
+          </a:p>
+          <a:p>
+            <a:pPr lvl="2"/>
+            <a:r>
+              <a:rPr lang="de-DE"/>
+              <a:t>Dritte Ebene</a:t>
+            </a:r>
+          </a:p>
+          <a:p>
+            <a:pPr lvl="3"/>
+            <a:r>
+              <a:rPr lang="de-DE"/>
+              <a:t>Vierte Ebene</a:t>
+            </a:r>
+          </a:p>
+          <a:p>
+            <a:pPr lvl="4"/>
+            <a:r>
+              <a:rPr lang="de-DE"/>
+              <a:t>Fünfte Ebene</a:t>
+            </a:r>
+          </a:p>
+        </p:txBody>
+      </p:sp>
+      <p:sp>
+        <p:nvSpPr>
+          <p:cNvPr id="6" name="Fußzeilenplatzhalter 5"/>
+          <p:cNvSpPr>
+            <a:spLocks noGrp="1"/>
+          </p:cNvSpPr>
+          <p:nvPr>
+            <p:ph type="ftr" sz="quarter" idx="4"/>
+          </p:nvPr>
+        </p:nvSpPr>
+        <p:spPr>
+          <a:xfrm>
+            <a:off x="0" y="8685213"/>
+            <a:ext cx="2971800" cy="458787"/>
+          </a:xfrm>
+          <a:prstGeom prst="rect">
+            <a:avLst/>
+          </a:prstGeom>
+        </p:spPr>
+        <p:txBody>
+          <a:bodyPr vert="horz" lIns="91440" tIns="45720" rIns="91440" bIns="45720" rtlCol="0" anchor="b"/>
+          <a:lstStyle>
+            <a:lvl1pPr algn="l">
+              <a:defRPr sz="1200"/>
+            </a:lvl1pPr>
+          </a:lstStyle>
+          <a:p>
+            <a:endParaRPr lang="de-DE"/>
+          </a:p>
+        </p:txBody>
+      </p:sp>
+      <p:sp>
+        <p:nvSpPr>
+          <p:cNvPr id="7" name="Foliennummernplatzhalter 6"/>
+          <p:cNvSpPr>
+            <a:spLocks noGrp="1"/>
+          </p:cNvSpPr>
+          <p:nvPr>
+            <p:ph type="sldNum" sz="quarter" idx="5"/>
+          </p:nvPr>
+        </p:nvSpPr>
+        <p:spPr>
+          <a:xfrm>
+            <a:off x="3884613" y="8685213"/>
+            <a:ext cx="2971800" cy="458787"/>
+          </a:xfrm>
+          <a:prstGeom prst="rect">
+            <a:avLst/>
+          </a:prstGeom>
+        </p:spPr>
+        <p:txBody>
+          <a:bodyPr vert="horz" lIns="91440" tIns="45720" rIns="91440" bIns="45720" rtlCol="0" anchor="b"/>
+          <a:lstStyle>
+            <a:lvl1pPr algn="r">
+              <a:defRPr sz="1200"/>
+            </a:lvl1pPr>
+          </a:lstStyle>
+          <a:p>
+            <a:fld id="{DC9C6A5F-378A-43A8-A888-BA03EAE35081}" type="slidenum">
+              <a:rPr lang="de-DE" smtClean="0"/>
+              <a:t>‹Nr.›</a:t>
+            </a:fld>
+            <a:endParaRPr lang="de-DE"/>
+          </a:p>
+        </p:txBody>
+      </p:sp>
+    </p:spTree>
+    <p:extLst>
+      <p:ext uri="{BB962C8B-B14F-4D97-AF65-F5344CB8AC3E}">
+        <p14:creationId xmlns:p14="http://schemas.microsoft.com/office/powerpoint/2010/main" val="2372822823"/>
+      </p:ext>
+    </p:extLst>
+  </p:cSld>
+  <p:clrMap bg1="lt1" tx1="dk1" bg2="lt2" tx2="dk2" accent1="accent1" accent2="accent2" accent3="accent3" accent4="accent4" accent5="accent5" accent6="accent6" hlink="hlink" folHlink="folHlink"/>
+  <p:notesStyle>
+    <a:lvl1pPr marL="0" algn="l" defTabSz="914400" rtl="0" eaLnBrk="1" latinLnBrk="0" hangingPunct="1">
+      <a:defRPr sz="1200" kern="1200">
+        <a:solidFill>
+          <a:schemeClr val="tx1"/>
+        </a:solidFill>
+        <a:latin typeface="+mn-lt"/>
+        <a:ea typeface="+mn-ea"/>
+        <a:cs typeface="+mn-cs"/>
+      </a:defRPr>
+    </a:lvl1pPr>
+    <a:lvl2pPr marL="457200" algn="l" defTabSz="914400" rtl="0" eaLnBrk="1" latinLnBrk="0" hangingPunct="1">
+      <a:defRPr sz="1200" kern="1200">
+        <a:solidFill>
+          <a:schemeClr val="tx1"/>
+        </a:solidFill>
+        <a:latin typeface="+mn-lt"/>
+        <a:ea typeface="+mn-ea"/>
+        <a:cs typeface="+mn-cs"/>
+      </a:defRPr>
+    </a:lvl2pPr>
+    <a:lvl3pPr marL="914400" algn="l" defTabSz="914400" rtl="0" eaLnBrk="1" latinLnBrk="0" hangingPunct="1">
+      <a:defRPr sz="1200" kern="1200">
+        <a:solidFill>
+          <a:schemeClr val="tx1"/>
+        </a:solidFill>
+        <a:latin typeface="+mn-lt"/>
+        <a:ea typeface="+mn-ea"/>
+        <a:cs typeface="+mn-cs"/>
+      </a:defRPr>
+    </a:lvl3pPr>
+    <a:lvl4pPr marL="1371600" algn="l" defTabSz="914400" rtl="0" eaLnBrk="1" latinLnBrk="0" hangingPunct="1">
+      <a:defRPr sz="1200" kern="1200">
+        <a:solidFill>
+          <a:schemeClr val="tx1"/>
+        </a:solidFill>
+        <a:latin typeface="+mn-lt"/>
+        <a:ea typeface="+mn-ea"/>
+        <a:cs typeface="+mn-cs"/>
+      </a:defRPr>
+    </a:lvl4pPr>
+    <a:lvl5pPr marL="1828800" algn="l" defTabSz="914400" rtl="0" eaLnBrk="1" latinLnBrk="0" hangingPunct="1">
+      <a:defRPr sz="1200" kern="1200">
+        <a:solidFill>
+          <a:schemeClr val="tx1"/>
+        </a:solidFill>
+        <a:latin typeface="+mn-lt"/>
+        <a:ea typeface="+mn-ea"/>
+        <a:cs typeface="+mn-cs"/>
+      </a:defRPr>
+    </a:lvl5pPr>
+    <a:lvl6pPr marL="2286000" algn="l" defTabSz="914400" rtl="0" eaLnBrk="1" latinLnBrk="0" hangingPunct="1">
+      <a:defRPr sz="1200" kern="1200">
+        <a:solidFill>
+          <a:schemeClr val="tx1"/>
+        </a:solidFill>
+        <a:latin typeface="+mn-lt"/>
+        <a:ea typeface="+mn-ea"/>
+        <a:cs typeface="+mn-cs"/>
+      </a:defRPr>
+    </a:lvl6pPr>
+    <a:lvl7pPr marL="2743200" algn="l" defTabSz="914400" rtl="0" eaLnBrk="1" latinLnBrk="0" hangingPunct="1">
+      <a:defRPr sz="1200" kern="1200">
+        <a:solidFill>
+          <a:schemeClr val="tx1"/>
+        </a:solidFill>
+        <a:latin typeface="+mn-lt"/>
+        <a:ea typeface="+mn-ea"/>
+        <a:cs typeface="+mn-cs"/>
+      </a:defRPr>
+    </a:lvl7pPr>
+    <a:lvl8pPr marL="3200400" algn="l" defTabSz="914400" rtl="0" eaLnBrk="1" latinLnBrk="0" hangingPunct="1">
+      <a:defRPr sz="1200" kern="1200">
+        <a:solidFill>
+          <a:schemeClr val="tx1"/>
+        </a:solidFill>
+        <a:latin typeface="+mn-lt"/>
+        <a:ea typeface="+mn-ea"/>
+        <a:cs typeface="+mn-cs"/>
+      </a:defRPr>
+    </a:lvl8pPr>
+    <a:lvl9pPr marL="3657600" algn="l" defTabSz="914400" rtl="0" eaLnBrk="1" latinLnBrk="0" hangingPunct="1">
+      <a:defRPr sz="1200" kern="1200">
+        <a:solidFill>
+          <a:schemeClr val="tx1"/>
+        </a:solidFill>
+        <a:latin typeface="+mn-lt"/>
+        <a:ea typeface="+mn-ea"/>
+        <a:cs typeface="+mn-cs"/>
+      </a:defRPr>
+    </a:lvl9pPr>
+  </p:notesStyle>
+</p:notesMaster>
 </file>
 
 <file path=ppt/slideLayouts/slideLayout1.xml><?xml version="1.0" encoding="utf-8"?>
@@ -814,7 +1341,7 @@
           <a:p>
             <a:fld id="{1C760FE3-A85F-42BC-8F15-773C19544183}" type="datetimeFigureOut">
               <a:rPr lang="de-DE" smtClean="0"/>
-              <a:t>07.04.2023</a:t>
+              <a:t>20.04.2023</a:t>
             </a:fld>
             <a:endParaRPr lang="de-DE"/>
           </a:p>
@@ -1012,7 +1539,7 @@
           <a:p>
             <a:fld id="{1C760FE3-A85F-42BC-8F15-773C19544183}" type="datetimeFigureOut">
               <a:rPr lang="de-DE" smtClean="0"/>
-              <a:t>07.04.2023</a:t>
+              <a:t>20.04.2023</a:t>
             </a:fld>
             <a:endParaRPr lang="de-DE"/>
           </a:p>
@@ -1220,7 +1747,7 @@
           <a:p>
             <a:fld id="{1C760FE3-A85F-42BC-8F15-773C19544183}" type="datetimeFigureOut">
               <a:rPr lang="de-DE" smtClean="0"/>
-              <a:t>07.04.2023</a:t>
+              <a:t>20.04.2023</a:t>
             </a:fld>
             <a:endParaRPr lang="de-DE"/>
           </a:p>
@@ -1418,7 +1945,7 @@
           <a:p>
             <a:fld id="{1C760FE3-A85F-42BC-8F15-773C19544183}" type="datetimeFigureOut">
               <a:rPr lang="de-DE" smtClean="0"/>
-              <a:t>07.04.2023</a:t>
+              <a:t>20.04.2023</a:t>
             </a:fld>
             <a:endParaRPr lang="de-DE"/>
           </a:p>
@@ -1693,7 +2220,7 @@
           <a:p>
             <a:fld id="{1C760FE3-A85F-42BC-8F15-773C19544183}" type="datetimeFigureOut">
               <a:rPr lang="de-DE" smtClean="0"/>
-              <a:t>07.04.2023</a:t>
+              <a:t>20.04.2023</a:t>
             </a:fld>
             <a:endParaRPr lang="de-DE"/>
           </a:p>
@@ -1958,7 +2485,7 @@
           <a:p>
             <a:fld id="{1C760FE3-A85F-42BC-8F15-773C19544183}" type="datetimeFigureOut">
               <a:rPr lang="de-DE" smtClean="0"/>
-              <a:t>07.04.2023</a:t>
+              <a:t>20.04.2023</a:t>
             </a:fld>
             <a:endParaRPr lang="de-DE"/>
           </a:p>
@@ -2370,7 +2897,7 @@
           <a:p>
             <a:fld id="{1C760FE3-A85F-42BC-8F15-773C19544183}" type="datetimeFigureOut">
               <a:rPr lang="de-DE" smtClean="0"/>
-              <a:t>07.04.2023</a:t>
+              <a:t>20.04.2023</a:t>
             </a:fld>
             <a:endParaRPr lang="de-DE"/>
           </a:p>
@@ -2511,7 +3038,7 @@
           <a:p>
             <a:fld id="{1C760FE3-A85F-42BC-8F15-773C19544183}" type="datetimeFigureOut">
               <a:rPr lang="de-DE" smtClean="0"/>
-              <a:t>07.04.2023</a:t>
+              <a:t>20.04.2023</a:t>
             </a:fld>
             <a:endParaRPr lang="de-DE"/>
           </a:p>
@@ -2624,7 +3151,7 @@
           <a:p>
             <a:fld id="{1C760FE3-A85F-42BC-8F15-773C19544183}" type="datetimeFigureOut">
               <a:rPr lang="de-DE" smtClean="0"/>
-              <a:t>07.04.2023</a:t>
+              <a:t>20.04.2023</a:t>
             </a:fld>
             <a:endParaRPr lang="de-DE"/>
           </a:p>
@@ -2935,7 +3462,7 @@
           <a:p>
             <a:fld id="{1C760FE3-A85F-42BC-8F15-773C19544183}" type="datetimeFigureOut">
               <a:rPr lang="de-DE" smtClean="0"/>
-              <a:t>07.04.2023</a:t>
+              <a:t>20.04.2023</a:t>
             </a:fld>
             <a:endParaRPr lang="de-DE"/>
           </a:p>
@@ -3223,7 +3750,7 @@
           <a:p>
             <a:fld id="{1C760FE3-A85F-42BC-8F15-773C19544183}" type="datetimeFigureOut">
               <a:rPr lang="de-DE" smtClean="0"/>
-              <a:t>07.04.2023</a:t>
+              <a:t>20.04.2023</a:t>
             </a:fld>
             <a:endParaRPr lang="de-DE"/>
           </a:p>
@@ -3464,7 +3991,7 @@
           <a:p>
             <a:fld id="{1C760FE3-A85F-42BC-8F15-773C19544183}" type="datetimeFigureOut">
               <a:rPr lang="de-DE" smtClean="0"/>
-              <a:t>07.04.2023</a:t>
+              <a:t>20.04.2023</a:t>
             </a:fld>
             <a:endParaRPr lang="de-DE"/>
           </a:p>
@@ -8766,17 +9293,45 @@
           <a:p>
             <a:r>
               <a:rPr lang="de-DE" dirty="0"/>
-              <a:t>Prototyp(Mobile)</a:t>
+              <a:t>UC Info(Mobile)</a:t>
+            </a:r>
+          </a:p>
+        </p:txBody>
+      </p:sp>
+      <p:sp>
+        <p:nvSpPr>
+          <p:cNvPr id="3" name="Fußzeilenplatzhalter 2">
+            <a:extLst>
+              <a:ext uri="{FF2B5EF4-FFF2-40B4-BE49-F238E27FC236}">
+                <a16:creationId xmlns:a16="http://schemas.microsoft.com/office/drawing/2014/main" id="{F8483B73-6FB5-00B5-0ABE-A87A95B92B3C}"/>
+              </a:ext>
+            </a:extLst>
+          </p:cNvPr>
+          <p:cNvSpPr>
+            <a:spLocks noGrp="1"/>
+          </p:cNvSpPr>
+          <p:nvPr>
+            <p:ph type="ftr" sz="quarter" idx="11"/>
+          </p:nvPr>
+        </p:nvSpPr>
+        <p:spPr/>
+        <p:txBody>
+          <a:bodyPr/>
+          <a:lstStyle/>
+          <a:p>
+            <a:r>
+              <a:rPr lang="de-DE"/>
+              <a:t>https://www.figma.com/file/kYdUcZe2TGO4WvaNcswJFN/Mobile-WT?t=yAqyTt1dIdrnEdjT-0</a:t>
             </a:r>
           </a:p>
         </p:txBody>
       </p:sp>
       <p:pic>
         <p:nvPicPr>
-          <p:cNvPr id="4" name="Grafik 3">
-            <a:extLst>
-              <a:ext uri="{FF2B5EF4-FFF2-40B4-BE49-F238E27FC236}">
-                <a16:creationId xmlns:a16="http://schemas.microsoft.com/office/drawing/2014/main" id="{85F1854B-D1F7-CE14-BE9C-5A2AC72770E7}"/>
+          <p:cNvPr id="6" name="Grafik 5">
+            <a:extLst>
+              <a:ext uri="{FF2B5EF4-FFF2-40B4-BE49-F238E27FC236}">
+                <a16:creationId xmlns:a16="http://schemas.microsoft.com/office/drawing/2014/main" id="{20F0AC27-6133-A2CF-DB02-2D3B8E1B34A9}"/>
               </a:ext>
             </a:extLst>
           </p:cNvPr>
@@ -8793,8 +9348,8 @@
         </p:blipFill>
         <p:spPr>
           <a:xfrm>
-            <a:off x="4833689" y="170995"/>
-            <a:ext cx="7144747" cy="6516009"/>
+            <a:off x="4623895" y="2288"/>
+            <a:ext cx="7059010" cy="6354062"/>
           </a:xfrm>
           <a:prstGeom prst="rect">
             <a:avLst/>
@@ -9001,16 +9556,20 @@
           <a:bodyPr/>
           <a:lstStyle/>
           <a:p>
-            <a:endParaRPr lang="de-DE" dirty="0"/>
+            <a:pPr algn="ctr"/>
+            <a:r>
+              <a:rPr lang="de-DE" dirty="0"/>
+              <a:t>UC INFO</a:t>
+            </a:r>
           </a:p>
         </p:txBody>
       </p:sp>
       <p:pic>
         <p:nvPicPr>
-          <p:cNvPr id="6" name="Inhaltsplatzhalter 5">
-            <a:extLst>
-              <a:ext uri="{FF2B5EF4-FFF2-40B4-BE49-F238E27FC236}">
-                <a16:creationId xmlns:a16="http://schemas.microsoft.com/office/drawing/2014/main" id="{88926D69-DF47-9DE2-CFD4-041533A6899E}"/>
+          <p:cNvPr id="11" name="Inhaltsplatzhalter 10">
+            <a:extLst>
+              <a:ext uri="{FF2B5EF4-FFF2-40B4-BE49-F238E27FC236}">
+                <a16:creationId xmlns:a16="http://schemas.microsoft.com/office/drawing/2014/main" id="{0120A8BF-6FDC-AF10-675D-9E68B803CEF7}"/>
               </a:ext>
             </a:extLst>
           </p:cNvPr>
@@ -9029,105 +9588,220 @@
         </p:blipFill>
         <p:spPr>
           <a:xfrm>
-            <a:off x="0" y="9428"/>
-            <a:ext cx="12192000" cy="6871456"/>
+            <a:off x="2257820" y="1825625"/>
+            <a:ext cx="7676360" cy="4351338"/>
           </a:xfrm>
         </p:spPr>
       </p:pic>
+      <p:sp>
+        <p:nvSpPr>
+          <p:cNvPr id="7" name="Fußzeilenplatzhalter 6">
+            <a:extLst>
+              <a:ext uri="{FF2B5EF4-FFF2-40B4-BE49-F238E27FC236}">
+                <a16:creationId xmlns:a16="http://schemas.microsoft.com/office/drawing/2014/main" id="{C144BCB7-CD3F-B9D9-C1A8-AEBE4B28BD9B}"/>
+              </a:ext>
+            </a:extLst>
+          </p:cNvPr>
+          <p:cNvSpPr>
+            <a:spLocks noGrp="1"/>
+          </p:cNvSpPr>
+          <p:nvPr>
+            <p:ph type="ftr" sz="quarter" idx="11"/>
+          </p:nvPr>
+        </p:nvSpPr>
+        <p:spPr/>
+        <p:txBody>
+          <a:bodyPr/>
+          <a:lstStyle/>
+          <a:p>
+            <a:r>
+              <a:rPr lang="de-DE"/>
+              <a:t>https://www.figma.com/file/Ahn5p8T3juhSWOAAd1LUo7/Desktop-WT?node-id=0-1&amp;t=g8eGCxceAqY9JeWE-0</a:t>
+            </a:r>
+          </a:p>
+        </p:txBody>
+      </p:sp>
+    </p:spTree>
+    <p:extLst>
+      <p:ext uri="{BB962C8B-B14F-4D97-AF65-F5344CB8AC3E}">
+        <p14:creationId xmlns:p14="http://schemas.microsoft.com/office/powerpoint/2010/main" val="642237072"/>
+      </p:ext>
+    </p:extLst>
+  </p:cSld>
+  <p:clrMapOvr>
+    <a:masterClrMapping/>
+  </p:clrMapOvr>
+</p:sld>
+</file>
+
+<file path=ppt/slides/slide21.xml><?xml version="1.0" encoding="utf-8"?>
+<p:sld xmlns:a="http://schemas.openxmlformats.org/drawingml/2006/main" xmlns:r="http://schemas.openxmlformats.org/officeDocument/2006/relationships" xmlns:p="http://schemas.openxmlformats.org/presentationml/2006/main">
+  <p:cSld>
+    <p:spTree>
+      <p:nvGrpSpPr>
+        <p:cNvPr id="1" name=""/>
+        <p:cNvGrpSpPr/>
+        <p:nvPr/>
+      </p:nvGrpSpPr>
+      <p:grpSpPr>
+        <a:xfrm>
+          <a:off x="0" y="0"/>
+          <a:ext cx="0" cy="0"/>
+          <a:chOff x="0" y="0"/>
+          <a:chExt cx="0" cy="0"/>
+        </a:xfrm>
+      </p:grpSpPr>
+      <p:sp>
+        <p:nvSpPr>
+          <p:cNvPr id="4" name="Titel 3">
+            <a:extLst>
+              <a:ext uri="{FF2B5EF4-FFF2-40B4-BE49-F238E27FC236}">
+                <a16:creationId xmlns:a16="http://schemas.microsoft.com/office/drawing/2014/main" id="{7F778F60-9CC1-C449-572F-8A8864A3FB0B}"/>
+              </a:ext>
+            </a:extLst>
+          </p:cNvPr>
+          <p:cNvSpPr>
+            <a:spLocks noGrp="1"/>
+          </p:cNvSpPr>
+          <p:nvPr>
+            <p:ph type="ctrTitle"/>
+          </p:nvPr>
+        </p:nvSpPr>
+        <p:spPr/>
+        <p:txBody>
+          <a:bodyPr/>
+          <a:lstStyle/>
+          <a:p>
+            <a:r>
+              <a:rPr lang="de-DE" dirty="0"/>
+              <a:t>Datenbank</a:t>
+            </a:r>
+          </a:p>
+        </p:txBody>
+      </p:sp>
+      <p:sp>
+        <p:nvSpPr>
+          <p:cNvPr id="5" name="Untertitel 4">
+            <a:extLst>
+              <a:ext uri="{FF2B5EF4-FFF2-40B4-BE49-F238E27FC236}">
+                <a16:creationId xmlns:a16="http://schemas.microsoft.com/office/drawing/2014/main" id="{4F6523E6-17CC-2CE0-E565-03647EBF73D3}"/>
+              </a:ext>
+            </a:extLst>
+          </p:cNvPr>
+          <p:cNvSpPr>
+            <a:spLocks noGrp="1"/>
+          </p:cNvSpPr>
+          <p:nvPr>
+            <p:ph type="subTitle" idx="1"/>
+          </p:nvPr>
+        </p:nvSpPr>
+        <p:spPr/>
+        <p:txBody>
+          <a:bodyPr/>
+          <a:lstStyle/>
+          <a:p>
+            <a:endParaRPr lang="de-DE"/>
+          </a:p>
+        </p:txBody>
+      </p:sp>
+    </p:spTree>
+    <p:extLst>
+      <p:ext uri="{BB962C8B-B14F-4D97-AF65-F5344CB8AC3E}">
+        <p14:creationId xmlns:p14="http://schemas.microsoft.com/office/powerpoint/2010/main" val="441623518"/>
+      </p:ext>
+    </p:extLst>
+  </p:cSld>
+  <p:clrMapOvr>
+    <a:masterClrMapping/>
+  </p:clrMapOvr>
+</p:sld>
+</file>
+
+<file path=ppt/slides/slide22.xml><?xml version="1.0" encoding="utf-8"?>
+<p:sld xmlns:a="http://schemas.openxmlformats.org/drawingml/2006/main" xmlns:r="http://schemas.openxmlformats.org/officeDocument/2006/relationships" xmlns:p="http://schemas.openxmlformats.org/presentationml/2006/main">
+  <p:cSld>
+    <p:spTree>
+      <p:nvGrpSpPr>
+        <p:cNvPr id="1" name=""/>
+        <p:cNvGrpSpPr/>
+        <p:nvPr/>
+      </p:nvGrpSpPr>
+      <p:grpSpPr>
+        <a:xfrm>
+          <a:off x="0" y="0"/>
+          <a:ext cx="0" cy="0"/>
+          <a:chOff x="0" y="0"/>
+          <a:chExt cx="0" cy="0"/>
+        </a:xfrm>
+      </p:grpSpPr>
+      <p:sp>
+        <p:nvSpPr>
+          <p:cNvPr id="2" name="Titel 1">
+            <a:extLst>
+              <a:ext uri="{FF2B5EF4-FFF2-40B4-BE49-F238E27FC236}">
+                <a16:creationId xmlns:a16="http://schemas.microsoft.com/office/drawing/2014/main" id="{CA15BB45-5CFD-3056-AEE5-64F4474D6FC7}"/>
+              </a:ext>
+            </a:extLst>
+          </p:cNvPr>
+          <p:cNvSpPr>
+            <a:spLocks noGrp="1"/>
+          </p:cNvSpPr>
+          <p:nvPr>
+            <p:ph type="title"/>
+          </p:nvPr>
+        </p:nvSpPr>
+        <p:spPr/>
+        <p:txBody>
+          <a:bodyPr/>
+          <a:lstStyle/>
+          <a:p>
+            <a:pPr algn="ctr"/>
+            <a:r>
+              <a:rPr lang="de-DE" dirty="0"/>
+              <a:t>ER Diagramm</a:t>
+            </a:r>
+          </a:p>
+        </p:txBody>
+      </p:sp>
       <p:pic>
         <p:nvPicPr>
-          <p:cNvPr id="8" name="Grafik 7">
-            <a:extLst>
-              <a:ext uri="{FF2B5EF4-FFF2-40B4-BE49-F238E27FC236}">
-                <a16:creationId xmlns:a16="http://schemas.microsoft.com/office/drawing/2014/main" id="{70E92C90-C040-345C-814C-33A8198336AD}"/>
+          <p:cNvPr id="5" name="Inhaltsplatzhalter 4" descr="Ein Bild, das Text, Elektronik, Screenshot enthält.">
+            <a:extLst>
+              <a:ext uri="{FF2B5EF4-FFF2-40B4-BE49-F238E27FC236}">
+                <a16:creationId xmlns:a16="http://schemas.microsoft.com/office/drawing/2014/main" id="{B43A6382-AD2D-16E5-E94A-712E13782CDA}"/>
               </a:ext>
             </a:extLst>
           </p:cNvPr>
           <p:cNvPicPr>
-            <a:picLocks noChangeAspect="1"/>
+            <a:picLocks noGrp="1" noChangeAspect="1"/>
           </p:cNvPicPr>
-          <p:nvPr/>
+          <p:nvPr>
+            <p:ph idx="1"/>
+          </p:nvPr>
         </p:nvPicPr>
         <p:blipFill>
-          <a:blip r:embed="rId3"/>
+          <a:blip r:embed="rId2">
+            <a:extLst>
+              <a:ext uri="{28A0092B-C50C-407E-A947-70E740481C1C}">
+                <a14:useLocalDpi xmlns:a14="http://schemas.microsoft.com/office/drawing/2010/main" val="0"/>
+              </a:ext>
+            </a:extLst>
+          </a:blip>
           <a:stretch>
             <a:fillRect/>
           </a:stretch>
         </p:blipFill>
         <p:spPr>
           <a:xfrm>
-            <a:off x="9236" y="20059"/>
-            <a:ext cx="12182764" cy="6823053"/>
-          </a:xfrm>
-          <a:prstGeom prst="rect">
-            <a:avLst/>
-          </a:prstGeom>
-        </p:spPr>
-      </p:pic>
-      <p:pic>
-        <p:nvPicPr>
-          <p:cNvPr id="10" name="Grafik 9">
-            <a:extLst>
-              <a:ext uri="{FF2B5EF4-FFF2-40B4-BE49-F238E27FC236}">
-                <a16:creationId xmlns:a16="http://schemas.microsoft.com/office/drawing/2014/main" id="{9B3B01A1-B384-4BBD-A0A1-FA1123CC1DB5}"/>
-              </a:ext>
-            </a:extLst>
-          </p:cNvPr>
-          <p:cNvPicPr>
-            <a:picLocks noChangeAspect="1"/>
-          </p:cNvPicPr>
-          <p:nvPr/>
-        </p:nvPicPr>
-        <p:blipFill>
-          <a:blip r:embed="rId4"/>
-          <a:stretch>
-            <a:fillRect/>
-          </a:stretch>
-        </p:blipFill>
-        <p:spPr>
-          <a:xfrm>
-            <a:off x="1951" y="0"/>
-            <a:ext cx="12188098" cy="6880884"/>
-          </a:xfrm>
-          <a:prstGeom prst="rect">
-            <a:avLst/>
-          </a:prstGeom>
-        </p:spPr>
-      </p:pic>
-      <p:pic>
-        <p:nvPicPr>
-          <p:cNvPr id="4" name="Grafik 3">
-            <a:extLst>
-              <a:ext uri="{FF2B5EF4-FFF2-40B4-BE49-F238E27FC236}">
-                <a16:creationId xmlns:a16="http://schemas.microsoft.com/office/drawing/2014/main" id="{01100B9A-4F21-DE69-114B-1C7917F3CCD3}"/>
-              </a:ext>
-            </a:extLst>
-          </p:cNvPr>
-          <p:cNvPicPr>
-            <a:picLocks noChangeAspect="1"/>
-          </p:cNvPicPr>
-          <p:nvPr/>
-        </p:nvPicPr>
-        <p:blipFill>
-          <a:blip r:embed="rId5"/>
-          <a:stretch>
-            <a:fillRect/>
-          </a:stretch>
-        </p:blipFill>
-        <p:spPr>
-          <a:xfrm>
-            <a:off x="0" y="19821"/>
-            <a:ext cx="12192000" cy="6818358"/>
-          </a:xfrm>
-          <a:prstGeom prst="rect">
-            <a:avLst/>
-          </a:prstGeom>
+            <a:off x="3276571" y="1825625"/>
+            <a:ext cx="5638857" cy="4351338"/>
+          </a:xfrm>
         </p:spPr>
       </p:pic>
     </p:spTree>
     <p:extLst>
       <p:ext uri="{BB962C8B-B14F-4D97-AF65-F5344CB8AC3E}">
-        <p14:creationId xmlns:p14="http://schemas.microsoft.com/office/powerpoint/2010/main" val="642237072"/>
+        <p14:creationId xmlns:p14="http://schemas.microsoft.com/office/powerpoint/2010/main" val="1571712763"/>
       </p:ext>
     </p:extLst>
   </p:cSld>
@@ -11886,4 +12560,299 @@
     </a:ext>
   </a:extLst>
 </a:theme>
+</file>
+
+<file path=ppt/theme/theme2.xml><?xml version="1.0" encoding="utf-8"?>
+<a:theme xmlns:a="http://schemas.openxmlformats.org/drawingml/2006/main" name="Office">
+  <a:themeElements>
+    <a:clrScheme name="Office">
+      <a:dk1>
+        <a:sysClr val="windowText" lastClr="000000"/>
+      </a:dk1>
+      <a:lt1>
+        <a:sysClr val="window" lastClr="FFFFFF"/>
+      </a:lt1>
+      <a:dk2>
+        <a:srgbClr val="44546A"/>
+      </a:dk2>
+      <a:lt2>
+        <a:srgbClr val="E7E6E6"/>
+      </a:lt2>
+      <a:accent1>
+        <a:srgbClr val="4472C4"/>
+      </a:accent1>
+      <a:accent2>
+        <a:srgbClr val="ED7D31"/>
+      </a:accent2>
+      <a:accent3>
+        <a:srgbClr val="A5A5A5"/>
+      </a:accent3>
+      <a:accent4>
+        <a:srgbClr val="FFC000"/>
+      </a:accent4>
+      <a:accent5>
+        <a:srgbClr val="5B9BD5"/>
+      </a:accent5>
+      <a:accent6>
+        <a:srgbClr val="70AD47"/>
+      </a:accent6>
+      <a:hlink>
+        <a:srgbClr val="0563C1"/>
+      </a:hlink>
+      <a:folHlink>
+        <a:srgbClr val="954F72"/>
+      </a:folHlink>
+    </a:clrScheme>
+    <a:fontScheme name="Office">
+      <a:majorFont>
+        <a:latin typeface="Calibri Light" panose="020F0302020204030204"/>
+        <a:ea typeface=""/>
+        <a:cs typeface=""/>
+        <a:font script="Jpan" typeface="游ゴシック Light"/>
+        <a:font script="Hang" typeface="맑은 고딕"/>
+        <a:font script="Hans" typeface="等线 Light"/>
+        <a:font script="Hant" typeface="新細明體"/>
+        <a:font script="Arab" typeface="Times New Roman"/>
+        <a:font script="Hebr" typeface="Times New Roman"/>
+        <a:font script="Thai" typeface="Angsana New"/>
+        <a:font script="Ethi" typeface="Nyala"/>
+        <a:font script="Beng" typeface="Vrinda"/>
+        <a:font script="Gujr" typeface="Shruti"/>
+        <a:font script="Khmr" typeface="MoolBoran"/>
+        <a:font script="Knda" typeface="Tunga"/>
+        <a:font script="Guru" typeface="Raavi"/>
+        <a:font script="Cans" typeface="Euphemia"/>
+        <a:font script="Cher" typeface="Plantagenet Cherokee"/>
+        <a:font script="Yiii" typeface="Microsoft Yi Baiti"/>
+        <a:font script="Tibt" typeface="Microsoft Himalaya"/>
+        <a:font script="Thaa" typeface="MV Boli"/>
+        <a:font script="Deva" typeface="Mangal"/>
+        <a:font script="Telu" typeface="Gautami"/>
+        <a:font script="Taml" typeface="Latha"/>
+        <a:font script="Syrc" typeface="Estrangelo Edessa"/>
+        <a:font script="Orya" typeface="Kalinga"/>
+        <a:font script="Mlym" typeface="Kartika"/>
+        <a:font script="Laoo" typeface="DokChampa"/>
+        <a:font script="Sinh" typeface="Iskoola Pota"/>
+        <a:font script="Mong" typeface="Mongolian Baiti"/>
+        <a:font script="Viet" typeface="Times New Roman"/>
+        <a:font script="Uigh" typeface="Microsoft Uighur"/>
+        <a:font script="Geor" typeface="Sylfaen"/>
+        <a:font script="Armn" typeface="Arial"/>
+        <a:font script="Bugi" typeface="Leelawadee UI"/>
+        <a:font script="Bopo" typeface="Microsoft JhengHei"/>
+        <a:font script="Java" typeface="Javanese Text"/>
+        <a:font script="Lisu" typeface="Segoe UI"/>
+        <a:font script="Mymr" typeface="Myanmar Text"/>
+        <a:font script="Nkoo" typeface="Ebrima"/>
+        <a:font script="Olck" typeface="Nirmala UI"/>
+        <a:font script="Osma" typeface="Ebrima"/>
+        <a:font script="Phag" typeface="Phagspa"/>
+        <a:font script="Syrn" typeface="Estrangelo Edessa"/>
+        <a:font script="Syrj" typeface="Estrangelo Edessa"/>
+        <a:font script="Syre" typeface="Estrangelo Edessa"/>
+        <a:font script="Sora" typeface="Nirmala UI"/>
+        <a:font script="Tale" typeface="Microsoft Tai Le"/>
+        <a:font script="Talu" typeface="Microsoft New Tai Lue"/>
+        <a:font script="Tfng" typeface="Ebrima"/>
+      </a:majorFont>
+      <a:minorFont>
+        <a:latin typeface="Calibri" panose="020F0502020204030204"/>
+        <a:ea typeface=""/>
+        <a:cs typeface=""/>
+        <a:font script="Jpan" typeface="游ゴシック"/>
+        <a:font script="Hang" typeface="맑은 고딕"/>
+        <a:font script="Hans" typeface="等线"/>
+        <a:font script="Hant" typeface="新細明體"/>
+        <a:font script="Arab" typeface="Arial"/>
+        <a:font script="Hebr" typeface="Arial"/>
+        <a:font script="Thai" typeface="Cordia New"/>
+        <a:font script="Ethi" typeface="Nyala"/>
+        <a:font script="Beng" typeface="Vrinda"/>
+        <a:font script="Gujr" typeface="Shruti"/>
+        <a:font script="Khmr" typeface="DaunPenh"/>
+        <a:font script="Knda" typeface="Tunga"/>
+        <a:font script="Guru" typeface="Raavi"/>
+        <a:font script="Cans" typeface="Euphemia"/>
+        <a:font script="Cher" typeface="Plantagenet Cherokee"/>
+        <a:font script="Yiii" typeface="Microsoft Yi Baiti"/>
+        <a:font script="Tibt" typeface="Microsoft Himalaya"/>
+        <a:font script="Thaa" typeface="MV Boli"/>
+        <a:font script="Deva" typeface="Mangal"/>
+        <a:font script="Telu" typeface="Gautami"/>
+        <a:font script="Taml" typeface="Latha"/>
+        <a:font script="Syrc" typeface="Estrangelo Edessa"/>
+        <a:font script="Orya" typeface="Kalinga"/>
+        <a:font script="Mlym" typeface="Kartika"/>
+        <a:font script="Laoo" typeface="DokChampa"/>
+        <a:font script="Sinh" typeface="Iskoola Pota"/>
+        <a:font script="Mong" typeface="Mongolian Baiti"/>
+        <a:font script="Viet" typeface="Arial"/>
+        <a:font script="Uigh" typeface="Microsoft Uighur"/>
+        <a:font script="Geor" typeface="Sylfaen"/>
+        <a:font script="Armn" typeface="Arial"/>
+        <a:font script="Bugi" typeface="Leelawadee UI"/>
+        <a:font script="Bopo" typeface="Microsoft JhengHei"/>
+        <a:font script="Java" typeface="Javanese Text"/>
+        <a:font script="Lisu" typeface="Segoe UI"/>
+        <a:font script="Mymr" typeface="Myanmar Text"/>
+        <a:font script="Nkoo" typeface="Ebrima"/>
+        <a:font script="Olck" typeface="Nirmala UI"/>
+        <a:font script="Osma" typeface="Ebrima"/>
+        <a:font script="Phag" typeface="Phagspa"/>
+        <a:font script="Syrn" typeface="Estrangelo Edessa"/>
+        <a:font script="Syrj" typeface="Estrangelo Edessa"/>
+        <a:font script="Syre" typeface="Estrangelo Edessa"/>
+        <a:font script="Sora" typeface="Nirmala UI"/>
+        <a:font script="Tale" typeface="Microsoft Tai Le"/>
+        <a:font script="Talu" typeface="Microsoft New Tai Lue"/>
+        <a:font script="Tfng" typeface="Ebrima"/>
+      </a:minorFont>
+    </a:fontScheme>
+    <a:fmtScheme name="Office">
+      <a:fillStyleLst>
+        <a:solidFill>
+          <a:schemeClr val="phClr"/>
+        </a:solidFill>
+        <a:gradFill rotWithShape="1">
+          <a:gsLst>
+            <a:gs pos="0">
+              <a:schemeClr val="phClr">
+                <a:lumMod val="110000"/>
+                <a:satMod val="105000"/>
+                <a:tint val="67000"/>
+              </a:schemeClr>
+            </a:gs>
+            <a:gs pos="50000">
+              <a:schemeClr val="phClr">
+                <a:lumMod val="105000"/>
+                <a:satMod val="103000"/>
+                <a:tint val="73000"/>
+              </a:schemeClr>
+            </a:gs>
+            <a:gs pos="100000">
+              <a:schemeClr val="phClr">
+                <a:lumMod val="105000"/>
+                <a:satMod val="109000"/>
+                <a:tint val="81000"/>
+              </a:schemeClr>
+            </a:gs>
+          </a:gsLst>
+          <a:lin ang="5400000" scaled="0"/>
+        </a:gradFill>
+        <a:gradFill rotWithShape="1">
+          <a:gsLst>
+            <a:gs pos="0">
+              <a:schemeClr val="phClr">
+                <a:satMod val="103000"/>
+                <a:lumMod val="102000"/>
+                <a:tint val="94000"/>
+              </a:schemeClr>
+            </a:gs>
+            <a:gs pos="50000">
+              <a:schemeClr val="phClr">
+                <a:satMod val="110000"/>
+                <a:lumMod val="100000"/>
+                <a:shade val="100000"/>
+              </a:schemeClr>
+            </a:gs>
+            <a:gs pos="100000">
+              <a:schemeClr val="phClr">
+                <a:lumMod val="99000"/>
+                <a:satMod val="120000"/>
+                <a:shade val="78000"/>
+              </a:schemeClr>
+            </a:gs>
+          </a:gsLst>
+          <a:lin ang="5400000" scaled="0"/>
+        </a:gradFill>
+      </a:fillStyleLst>
+      <a:lnStyleLst>
+        <a:ln w="6350" cap="flat" cmpd="sng" algn="ctr">
+          <a:solidFill>
+            <a:schemeClr val="phClr"/>
+          </a:solidFill>
+          <a:prstDash val="solid"/>
+          <a:miter lim="800000"/>
+        </a:ln>
+        <a:ln w="12700" cap="flat" cmpd="sng" algn="ctr">
+          <a:solidFill>
+            <a:schemeClr val="phClr"/>
+          </a:solidFill>
+          <a:prstDash val="solid"/>
+          <a:miter lim="800000"/>
+        </a:ln>
+        <a:ln w="19050" cap="flat" cmpd="sng" algn="ctr">
+          <a:solidFill>
+            <a:schemeClr val="phClr"/>
+          </a:solidFill>
+          <a:prstDash val="solid"/>
+          <a:miter lim="800000"/>
+        </a:ln>
+      </a:lnStyleLst>
+      <a:effectStyleLst>
+        <a:effectStyle>
+          <a:effectLst/>
+        </a:effectStyle>
+        <a:effectStyle>
+          <a:effectLst/>
+        </a:effectStyle>
+        <a:effectStyle>
+          <a:effectLst>
+            <a:outerShdw blurRad="57150" dist="19050" dir="5400000" algn="ctr" rotWithShape="0">
+              <a:srgbClr val="000000">
+                <a:alpha val="63000"/>
+              </a:srgbClr>
+            </a:outerShdw>
+          </a:effectLst>
+        </a:effectStyle>
+      </a:effectStyleLst>
+      <a:bgFillStyleLst>
+        <a:solidFill>
+          <a:schemeClr val="phClr"/>
+        </a:solidFill>
+        <a:solidFill>
+          <a:schemeClr val="phClr">
+            <a:tint val="95000"/>
+            <a:satMod val="170000"/>
+          </a:schemeClr>
+        </a:solidFill>
+        <a:gradFill rotWithShape="1">
+          <a:gsLst>
+            <a:gs pos="0">
+              <a:schemeClr val="phClr">
+                <a:tint val="93000"/>
+                <a:satMod val="150000"/>
+                <a:shade val="98000"/>
+                <a:lumMod val="102000"/>
+              </a:schemeClr>
+            </a:gs>
+            <a:gs pos="50000">
+              <a:schemeClr val="phClr">
+                <a:tint val="98000"/>
+                <a:satMod val="130000"/>
+                <a:shade val="90000"/>
+                <a:lumMod val="103000"/>
+              </a:schemeClr>
+            </a:gs>
+            <a:gs pos="100000">
+              <a:schemeClr val="phClr">
+                <a:shade val="63000"/>
+                <a:satMod val="120000"/>
+              </a:schemeClr>
+            </a:gs>
+          </a:gsLst>
+          <a:lin ang="5400000" scaled="0"/>
+        </a:gradFill>
+      </a:bgFillStyleLst>
+    </a:fmtScheme>
+  </a:themeElements>
+  <a:objectDefaults/>
+  <a:extraClrSchemeLst/>
+  <a:extLst>
+    <a:ext uri="{05A4C25C-085E-4340-85A3-A5531E510DB2}">
+      <thm15:themeFamily xmlns:thm15="http://schemas.microsoft.com/office/thememl/2012/main" name="Office Theme" id="{62F939B6-93AF-4DB8-9C6B-D6C7DFDC589F}" vid="{4A3C46E8-61CC-4603-A589-7422A47A8E4A}"/>
+    </a:ext>
+  </a:extLst>
+</a:theme>
 </file>
</xml_diff>

<commit_message>
add: vue storno, fix: article search, change: database to prod
</commit_message>
<xml_diff>
--- a/Zusatz_Material/Web-Technologie.pptx
+++ b/Zusatz_Material/Web-Technologie.pptx
@@ -935,7 +935,7 @@
           <a:p>
             <a:fld id="{ADB0D137-6C08-47E3-913F-08CE2AAEBB97}" type="datetimeFigureOut">
               <a:rPr lang="de-DE" smtClean="0"/>
-              <a:t>26.04.2023</a:t>
+              <a:t>21.06.2023</a:t>
             </a:fld>
             <a:endParaRPr lang="de-DE"/>
           </a:p>
@@ -1093,7 +1093,7 @@
           <a:p>
             <a:fld id="{DC9C6A5F-378A-43A8-A888-BA03EAE35081}" type="slidenum">
               <a:rPr lang="de-DE" smtClean="0"/>
-              <a:t>‹Nr.›</a:t>
+              <a:t>‹#›</a:t>
             </a:fld>
             <a:endParaRPr lang="de-DE"/>
           </a:p>
@@ -1349,7 +1349,7 @@
           <a:p>
             <a:fld id="{1C760FE3-A85F-42BC-8F15-773C19544183}" type="datetimeFigureOut">
               <a:rPr lang="de-DE" smtClean="0"/>
-              <a:t>26.04.2023</a:t>
+              <a:t>21.06.2023</a:t>
             </a:fld>
             <a:endParaRPr lang="de-DE"/>
           </a:p>
@@ -1403,7 +1403,7 @@
           <a:p>
             <a:fld id="{9947B336-1664-4520-9AD5-AA97DFAC467C}" type="slidenum">
               <a:rPr lang="de-DE" smtClean="0"/>
-              <a:t>‹Nr.›</a:t>
+              <a:t>‹#›</a:t>
             </a:fld>
             <a:endParaRPr lang="de-DE"/>
           </a:p>
@@ -1547,7 +1547,7 @@
           <a:p>
             <a:fld id="{1C760FE3-A85F-42BC-8F15-773C19544183}" type="datetimeFigureOut">
               <a:rPr lang="de-DE" smtClean="0"/>
-              <a:t>26.04.2023</a:t>
+              <a:t>21.06.2023</a:t>
             </a:fld>
             <a:endParaRPr lang="de-DE"/>
           </a:p>
@@ -1601,7 +1601,7 @@
           <a:p>
             <a:fld id="{9947B336-1664-4520-9AD5-AA97DFAC467C}" type="slidenum">
               <a:rPr lang="de-DE" smtClean="0"/>
-              <a:t>‹Nr.›</a:t>
+              <a:t>‹#›</a:t>
             </a:fld>
             <a:endParaRPr lang="de-DE"/>
           </a:p>
@@ -1755,7 +1755,7 @@
           <a:p>
             <a:fld id="{1C760FE3-A85F-42BC-8F15-773C19544183}" type="datetimeFigureOut">
               <a:rPr lang="de-DE" smtClean="0"/>
-              <a:t>26.04.2023</a:t>
+              <a:t>21.06.2023</a:t>
             </a:fld>
             <a:endParaRPr lang="de-DE"/>
           </a:p>
@@ -1809,7 +1809,7 @@
           <a:p>
             <a:fld id="{9947B336-1664-4520-9AD5-AA97DFAC467C}" type="slidenum">
               <a:rPr lang="de-DE" smtClean="0"/>
-              <a:t>‹Nr.›</a:t>
+              <a:t>‹#›</a:t>
             </a:fld>
             <a:endParaRPr lang="de-DE"/>
           </a:p>
@@ -1953,7 +1953,7 @@
           <a:p>
             <a:fld id="{1C760FE3-A85F-42BC-8F15-773C19544183}" type="datetimeFigureOut">
               <a:rPr lang="de-DE" smtClean="0"/>
-              <a:t>26.04.2023</a:t>
+              <a:t>21.06.2023</a:t>
             </a:fld>
             <a:endParaRPr lang="de-DE"/>
           </a:p>
@@ -2007,7 +2007,7 @@
           <a:p>
             <a:fld id="{9947B336-1664-4520-9AD5-AA97DFAC467C}" type="slidenum">
               <a:rPr lang="de-DE" smtClean="0"/>
-              <a:t>‹Nr.›</a:t>
+              <a:t>‹#›</a:t>
             </a:fld>
             <a:endParaRPr lang="de-DE"/>
           </a:p>
@@ -2228,7 +2228,7 @@
           <a:p>
             <a:fld id="{1C760FE3-A85F-42BC-8F15-773C19544183}" type="datetimeFigureOut">
               <a:rPr lang="de-DE" smtClean="0"/>
-              <a:t>26.04.2023</a:t>
+              <a:t>21.06.2023</a:t>
             </a:fld>
             <a:endParaRPr lang="de-DE"/>
           </a:p>
@@ -2282,7 +2282,7 @@
           <a:p>
             <a:fld id="{9947B336-1664-4520-9AD5-AA97DFAC467C}" type="slidenum">
               <a:rPr lang="de-DE" smtClean="0"/>
-              <a:t>‹Nr.›</a:t>
+              <a:t>‹#›</a:t>
             </a:fld>
             <a:endParaRPr lang="de-DE"/>
           </a:p>
@@ -2493,7 +2493,7 @@
           <a:p>
             <a:fld id="{1C760FE3-A85F-42BC-8F15-773C19544183}" type="datetimeFigureOut">
               <a:rPr lang="de-DE" smtClean="0"/>
-              <a:t>26.04.2023</a:t>
+              <a:t>21.06.2023</a:t>
             </a:fld>
             <a:endParaRPr lang="de-DE"/>
           </a:p>
@@ -2547,7 +2547,7 @@
           <a:p>
             <a:fld id="{9947B336-1664-4520-9AD5-AA97DFAC467C}" type="slidenum">
               <a:rPr lang="de-DE" smtClean="0"/>
-              <a:t>‹Nr.›</a:t>
+              <a:t>‹#›</a:t>
             </a:fld>
             <a:endParaRPr lang="de-DE"/>
           </a:p>
@@ -2905,7 +2905,7 @@
           <a:p>
             <a:fld id="{1C760FE3-A85F-42BC-8F15-773C19544183}" type="datetimeFigureOut">
               <a:rPr lang="de-DE" smtClean="0"/>
-              <a:t>26.04.2023</a:t>
+              <a:t>21.06.2023</a:t>
             </a:fld>
             <a:endParaRPr lang="de-DE"/>
           </a:p>
@@ -2959,7 +2959,7 @@
           <a:p>
             <a:fld id="{9947B336-1664-4520-9AD5-AA97DFAC467C}" type="slidenum">
               <a:rPr lang="de-DE" smtClean="0"/>
-              <a:t>‹Nr.›</a:t>
+              <a:t>‹#›</a:t>
             </a:fld>
             <a:endParaRPr lang="de-DE"/>
           </a:p>
@@ -3046,7 +3046,7 @@
           <a:p>
             <a:fld id="{1C760FE3-A85F-42BC-8F15-773C19544183}" type="datetimeFigureOut">
               <a:rPr lang="de-DE" smtClean="0"/>
-              <a:t>26.04.2023</a:t>
+              <a:t>21.06.2023</a:t>
             </a:fld>
             <a:endParaRPr lang="de-DE"/>
           </a:p>
@@ -3100,7 +3100,7 @@
           <a:p>
             <a:fld id="{9947B336-1664-4520-9AD5-AA97DFAC467C}" type="slidenum">
               <a:rPr lang="de-DE" smtClean="0"/>
-              <a:t>‹Nr.›</a:t>
+              <a:t>‹#›</a:t>
             </a:fld>
             <a:endParaRPr lang="de-DE"/>
           </a:p>
@@ -3159,7 +3159,7 @@
           <a:p>
             <a:fld id="{1C760FE3-A85F-42BC-8F15-773C19544183}" type="datetimeFigureOut">
               <a:rPr lang="de-DE" smtClean="0"/>
-              <a:t>26.04.2023</a:t>
+              <a:t>21.06.2023</a:t>
             </a:fld>
             <a:endParaRPr lang="de-DE"/>
           </a:p>
@@ -3213,7 +3213,7 @@
           <a:p>
             <a:fld id="{9947B336-1664-4520-9AD5-AA97DFAC467C}" type="slidenum">
               <a:rPr lang="de-DE" smtClean="0"/>
-              <a:t>‹Nr.›</a:t>
+              <a:t>‹#›</a:t>
             </a:fld>
             <a:endParaRPr lang="de-DE"/>
           </a:p>
@@ -3470,7 +3470,7 @@
           <a:p>
             <a:fld id="{1C760FE3-A85F-42BC-8F15-773C19544183}" type="datetimeFigureOut">
               <a:rPr lang="de-DE" smtClean="0"/>
-              <a:t>26.04.2023</a:t>
+              <a:t>21.06.2023</a:t>
             </a:fld>
             <a:endParaRPr lang="de-DE"/>
           </a:p>
@@ -3524,7 +3524,7 @@
           <a:p>
             <a:fld id="{9947B336-1664-4520-9AD5-AA97DFAC467C}" type="slidenum">
               <a:rPr lang="de-DE" smtClean="0"/>
-              <a:t>‹Nr.›</a:t>
+              <a:t>‹#›</a:t>
             </a:fld>
             <a:endParaRPr lang="de-DE"/>
           </a:p>
@@ -3758,7 +3758,7 @@
           <a:p>
             <a:fld id="{1C760FE3-A85F-42BC-8F15-773C19544183}" type="datetimeFigureOut">
               <a:rPr lang="de-DE" smtClean="0"/>
-              <a:t>26.04.2023</a:t>
+              <a:t>21.06.2023</a:t>
             </a:fld>
             <a:endParaRPr lang="de-DE"/>
           </a:p>
@@ -3812,7 +3812,7 @@
           <a:p>
             <a:fld id="{9947B336-1664-4520-9AD5-AA97DFAC467C}" type="slidenum">
               <a:rPr lang="de-DE" smtClean="0"/>
-              <a:t>‹Nr.›</a:t>
+              <a:t>‹#›</a:t>
             </a:fld>
             <a:endParaRPr lang="de-DE"/>
           </a:p>
@@ -3999,7 +3999,7 @@
           <a:p>
             <a:fld id="{1C760FE3-A85F-42BC-8F15-773C19544183}" type="datetimeFigureOut">
               <a:rPr lang="de-DE" smtClean="0"/>
-              <a:t>26.04.2023</a:t>
+              <a:t>21.06.2023</a:t>
             </a:fld>
             <a:endParaRPr lang="de-DE"/>
           </a:p>
@@ -4089,7 +4089,7 @@
           <a:p>
             <a:fld id="{9947B336-1664-4520-9AD5-AA97DFAC467C}" type="slidenum">
               <a:rPr lang="de-DE" smtClean="0"/>
-              <a:t>‹Nr.›</a:t>
+              <a:t>‹#›</a:t>
             </a:fld>
             <a:endParaRPr lang="de-DE"/>
           </a:p>
@@ -6555,7 +6555,7 @@
                   <a:schemeClr val="tx1"/>
                 </a:solidFill>
               </a:rPr>
-              <a:t>Zahladresse angeben</a:t>
+              <a:t>Bestätigen</a:t>
             </a:r>
           </a:p>
         </p:txBody>
@@ -6731,7 +6731,7 @@
                   <a:schemeClr val="tx1"/>
                 </a:solidFill>
               </a:rPr>
-              <a:t>Grund angeben</a:t>
+              <a:t>Artikel auswählen</a:t>
             </a:r>
           </a:p>
         </p:txBody>

</xml_diff>